<commit_message>
changed slides a bit. New class diagram to accurately represent the application
</commit_message>
<xml_diff>
--- a/DeliveryFiles/Presentations/Final Presentation.pptx
+++ b/DeliveryFiles/Presentations/Final Presentation.pptx
@@ -14,17 +14,18 @@
     <p:sldId id="260" r:id="rId8"/>
     <p:sldId id="261" r:id="rId9"/>
     <p:sldId id="262" r:id="rId10"/>
-    <p:sldId id="263" r:id="rId11"/>
-    <p:sldId id="264" r:id="rId12"/>
-    <p:sldId id="270" r:id="rId13"/>
-    <p:sldId id="273" r:id="rId14"/>
-    <p:sldId id="271" r:id="rId15"/>
-    <p:sldId id="276" r:id="rId16"/>
-    <p:sldId id="265" r:id="rId17"/>
-    <p:sldId id="266" r:id="rId18"/>
-    <p:sldId id="267" r:id="rId19"/>
-    <p:sldId id="268" r:id="rId20"/>
-    <p:sldId id="269" r:id="rId21"/>
+    <p:sldId id="279" r:id="rId11"/>
+    <p:sldId id="263" r:id="rId12"/>
+    <p:sldId id="264" r:id="rId13"/>
+    <p:sldId id="270" r:id="rId14"/>
+    <p:sldId id="273" r:id="rId15"/>
+    <p:sldId id="271" r:id="rId16"/>
+    <p:sldId id="276" r:id="rId17"/>
+    <p:sldId id="265" r:id="rId18"/>
+    <p:sldId id="266" r:id="rId19"/>
+    <p:sldId id="267" r:id="rId20"/>
+    <p:sldId id="268" r:id="rId21"/>
+    <p:sldId id="269" r:id="rId22"/>
   </p:sldIdLst>
   <p:sldSz cx="12192000" cy="6858000"/>
   <p:notesSz cx="6858000" cy="9144000"/>
@@ -877,7 +878,7 @@
             <a:fld id="{B61BEF0D-F0BB-DE4B-95CE-6DB70DBA9567}" type="datetimeFigureOut">
               <a:rPr lang="en-US" smtClean="0"/>
               <a:pPr/>
-              <a:t>5/3/2017</a:t>
+              <a:t>5/4/2017</a:t>
             </a:fld>
             <a:endParaRPr lang="en-US" dirty="0"/>
           </a:p>
@@ -1130,7 +1131,7 @@
             <a:fld id="{B61BEF0D-F0BB-DE4B-95CE-6DB70DBA9567}" type="datetimeFigureOut">
               <a:rPr lang="en-US" smtClean="0"/>
               <a:pPr/>
-              <a:t>5/3/2017</a:t>
+              <a:t>5/4/2017</a:t>
             </a:fld>
             <a:endParaRPr lang="en-US" dirty="0"/>
           </a:p>
@@ -1446,7 +1447,7 @@
             <a:fld id="{B61BEF0D-F0BB-DE4B-95CE-6DB70DBA9567}" type="datetimeFigureOut">
               <a:rPr lang="en-US" smtClean="0"/>
               <a:pPr/>
-              <a:t>5/3/2017</a:t>
+              <a:t>5/4/2017</a:t>
             </a:fld>
             <a:endParaRPr lang="en-US" dirty="0"/>
           </a:p>
@@ -1781,7 +1782,7 @@
             <a:fld id="{B61BEF0D-F0BB-DE4B-95CE-6DB70DBA9567}" type="datetimeFigureOut">
               <a:rPr lang="en-US" smtClean="0"/>
               <a:pPr/>
-              <a:t>5/3/2017</a:t>
+              <a:t>5/4/2017</a:t>
             </a:fld>
             <a:endParaRPr lang="en-US" dirty="0"/>
           </a:p>
@@ -2097,7 +2098,7 @@
             <a:fld id="{B61BEF0D-F0BB-DE4B-95CE-6DB70DBA9567}" type="datetimeFigureOut">
               <a:rPr lang="en-US" smtClean="0"/>
               <a:pPr/>
-              <a:t>5/3/2017</a:t>
+              <a:t>5/4/2017</a:t>
             </a:fld>
             <a:endParaRPr lang="en-US" dirty="0"/>
           </a:p>
@@ -2492,7 +2493,7 @@
             <a:fld id="{B61BEF0D-F0BB-DE4B-95CE-6DB70DBA9567}" type="datetimeFigureOut">
               <a:rPr lang="en-US" smtClean="0"/>
               <a:pPr/>
-              <a:t>5/3/2017</a:t>
+              <a:t>5/4/2017</a:t>
             </a:fld>
             <a:endParaRPr lang="en-US" dirty="0"/>
           </a:p>
@@ -2663,7 +2664,7 @@
           <a:p>
             <a:fld id="{55C6B4A9-1611-4792-9094-5F34BCA07E0B}" type="datetimeFigureOut">
               <a:rPr lang="en-US" smtClean="0"/>
-              <a:t>5/3/2017</a:t>
+              <a:t>5/4/2017</a:t>
             </a:fld>
             <a:endParaRPr lang="en-US" dirty="0"/>
           </a:p>
@@ -2844,7 +2845,7 @@
             <a:fld id="{B61BEF0D-F0BB-DE4B-95CE-6DB70DBA9567}" type="datetimeFigureOut">
               <a:rPr lang="en-US" smtClean="0"/>
               <a:pPr/>
-              <a:t>5/3/2017</a:t>
+              <a:t>5/4/2017</a:t>
             </a:fld>
             <a:endParaRPr lang="en-US" dirty="0"/>
           </a:p>
@@ -3016,7 +3017,7 @@
             <a:fld id="{B61BEF0D-F0BB-DE4B-95CE-6DB70DBA9567}" type="datetimeFigureOut">
               <a:rPr lang="en-US" smtClean="0"/>
               <a:pPr/>
-              <a:t>5/3/2017</a:t>
+              <a:t>5/4/2017</a:t>
             </a:fld>
             <a:endParaRPr lang="en-US" dirty="0"/>
           </a:p>
@@ -3265,7 +3266,7 @@
             <a:fld id="{B61BEF0D-F0BB-DE4B-95CE-6DB70DBA9567}" type="datetimeFigureOut">
               <a:rPr lang="en-US" smtClean="0"/>
               <a:pPr/>
-              <a:t>5/3/2017</a:t>
+              <a:t>5/4/2017</a:t>
             </a:fld>
             <a:endParaRPr lang="en-US" dirty="0"/>
           </a:p>
@@ -3498,7 +3499,7 @@
           <a:p>
             <a:fld id="{EB712588-04B1-427B-82EE-E8DB90309F08}" type="datetimeFigureOut">
               <a:rPr lang="en-US" smtClean="0"/>
-              <a:t>5/3/2017</a:t>
+              <a:t>5/4/2017</a:t>
             </a:fld>
             <a:endParaRPr lang="en-US" dirty="0"/>
           </a:p>
@@ -3873,7 +3874,7 @@
             <a:fld id="{B61BEF0D-F0BB-DE4B-95CE-6DB70DBA9567}" type="datetimeFigureOut">
               <a:rPr lang="en-US" smtClean="0"/>
               <a:pPr/>
-              <a:t>5/3/2017</a:t>
+              <a:t>5/4/2017</a:t>
             </a:fld>
             <a:endParaRPr lang="en-US" dirty="0"/>
           </a:p>
@@ -3998,7 +3999,7 @@
             <a:fld id="{B61BEF0D-F0BB-DE4B-95CE-6DB70DBA9567}" type="datetimeFigureOut">
               <a:rPr lang="en-US" smtClean="0"/>
               <a:pPr/>
-              <a:t>5/3/2017</a:t>
+              <a:t>5/4/2017</a:t>
             </a:fld>
             <a:endParaRPr lang="en-US" dirty="0"/>
           </a:p>
@@ -4095,7 +4096,7 @@
             <a:fld id="{B61BEF0D-F0BB-DE4B-95CE-6DB70DBA9567}" type="datetimeFigureOut">
               <a:rPr lang="en-US" smtClean="0"/>
               <a:pPr/>
-              <a:t>5/3/2017</a:t>
+              <a:t>5/4/2017</a:t>
             </a:fld>
             <a:endParaRPr lang="en-US" dirty="0"/>
           </a:p>
@@ -4351,7 +4352,7 @@
           <a:p>
             <a:fld id="{42A54C80-263E-416B-A8E0-580EDEADCBDC}" type="datetimeFigureOut">
               <a:rPr lang="en-US" smtClean="0"/>
-              <a:t>5/3/2017</a:t>
+              <a:t>5/4/2017</a:t>
             </a:fld>
             <a:endParaRPr lang="en-US" dirty="0"/>
           </a:p>
@@ -4658,7 +4659,7 @@
             <a:fld id="{B61BEF0D-F0BB-DE4B-95CE-6DB70DBA9567}" type="datetimeFigureOut">
               <a:rPr lang="en-US" smtClean="0"/>
               <a:pPr/>
-              <a:t>5/3/2017</a:t>
+              <a:t>5/4/2017</a:t>
             </a:fld>
             <a:endParaRPr lang="en-US" dirty="0"/>
           </a:p>
@@ -5361,7 +5362,7 @@
             <a:fld id="{B61BEF0D-F0BB-DE4B-95CE-6DB70DBA9567}" type="datetimeFigureOut">
               <a:rPr lang="en-US" smtClean="0"/>
               <a:pPr/>
-              <a:t>5/3/2017</a:t>
+              <a:t>5/4/2017</a:t>
             </a:fld>
             <a:endParaRPr lang="en-US" dirty="0"/>
           </a:p>
@@ -6152,44 +6153,58 @@
             <p:ph type="title"/>
           </p:nvPr>
         </p:nvSpPr>
+        <p:spPr/>
+        <p:txBody>
+          <a:bodyPr/>
+          <a:lstStyle/>
+          <a:p>
+            <a:r>
+              <a:rPr lang="en-US" dirty="0" smtClean="0"/>
+              <a:t>System Design – New Class Diagram</a:t>
+            </a:r>
+            <a:endParaRPr lang="en-US" dirty="0"/>
+          </a:p>
+        </p:txBody>
+      </p:sp>
+      <p:pic>
+        <p:nvPicPr>
+          <p:cNvPr id="4" name="Content Placeholder 3"/>
+          <p:cNvPicPr>
+            <a:picLocks noGrp="1" noChangeAspect="1"/>
+          </p:cNvPicPr>
+          <p:nvPr>
+            <p:ph idx="1"/>
+          </p:nvPr>
+        </p:nvPicPr>
+        <p:blipFill>
+          <a:blip r:embed="rId2">
+            <a:extLst>
+              <a:ext uri="{28A0092B-C50C-407E-A947-70E740481C1C}">
+                <a14:useLocalDpi xmlns:a14="http://schemas.microsoft.com/office/drawing/2010/main" val="0"/>
+              </a:ext>
+            </a:extLst>
+          </a:blip>
+          <a:stretch>
+            <a:fillRect/>
+          </a:stretch>
+        </p:blipFill>
         <p:spPr>
           <a:xfrm>
-            <a:off x="738294" y="2763520"/>
-            <a:ext cx="8596668" cy="1320800"/>
+            <a:off x="677334" y="1416676"/>
+            <a:ext cx="8492424" cy="4893972"/>
           </a:xfrm>
         </p:spPr>
-        <p:txBody>
-          <a:bodyPr>
-            <a:normAutofit/>
-          </a:bodyPr>
-          <a:lstStyle/>
-          <a:p>
-            <a:pPr algn="ctr"/>
-            <a:r>
-              <a:rPr lang="en-US" sz="5400" dirty="0" smtClean="0"/>
-              <a:t>Demo</a:t>
-            </a:r>
-            <a:endParaRPr lang="en-US" sz="5400" dirty="0"/>
-          </a:p>
-        </p:txBody>
-      </p:sp>
+      </p:pic>
     </p:spTree>
     <p:extLst>
       <p:ext uri="{BB962C8B-B14F-4D97-AF65-F5344CB8AC3E}">
-        <p14:creationId xmlns:p14="http://schemas.microsoft.com/office/powerpoint/2010/main" val="1832954467"/>
+        <p14:creationId xmlns:p14="http://schemas.microsoft.com/office/powerpoint/2010/main" val="4088721681"/>
       </p:ext>
     </p:extLst>
   </p:cSld>
   <p:clrMapOvr>
     <a:masterClrMapping/>
   </p:clrMapOvr>
-  <p:timing>
-    <p:tnLst>
-      <p:par>
-        <p:cTn id="1" dur="indefinite" restart="never" nodeType="tmRoot"/>
-      </p:par>
-    </p:tnLst>
-  </p:timing>
 </p:sld>
 </file>
 
@@ -6222,8 +6237,8 @@
         </p:nvSpPr>
         <p:spPr>
           <a:xfrm>
-            <a:off x="677334" y="609600"/>
-            <a:ext cx="8596668" cy="894080"/>
+            <a:off x="738294" y="2763520"/>
+            <a:ext cx="8596668" cy="1320800"/>
           </a:xfrm>
         </p:spPr>
         <p:txBody>
@@ -6234,105 +6249,17 @@
           <a:p>
             <a:pPr algn="ctr"/>
             <a:r>
-              <a:rPr lang="en-US" sz="4400" dirty="0" smtClean="0"/>
-              <a:t>Pros and Cons</a:t>
-            </a:r>
-            <a:endParaRPr lang="en-US" sz="4400" dirty="0"/>
-          </a:p>
-        </p:txBody>
-      </p:sp>
-      <p:sp>
-        <p:nvSpPr>
-          <p:cNvPr id="3" name="Content Placeholder 2"/>
-          <p:cNvSpPr>
-            <a:spLocks noGrp="1"/>
-          </p:cNvSpPr>
-          <p:nvPr>
-            <p:ph idx="1"/>
-          </p:nvPr>
-        </p:nvSpPr>
-        <p:spPr>
-          <a:xfrm>
-            <a:off x="677334" y="1524000"/>
-            <a:ext cx="8596668" cy="4693919"/>
-          </a:xfrm>
-        </p:spPr>
-        <p:txBody>
-          <a:bodyPr>
-            <a:normAutofit/>
-          </a:bodyPr>
-          <a:lstStyle/>
-          <a:p>
-            <a:r>
-              <a:rPr lang="en-US" sz="2800" dirty="0" smtClean="0"/>
-              <a:t>Pros</a:t>
-            </a:r>
-          </a:p>
-          <a:p>
-            <a:pPr lvl="1"/>
-            <a:r>
-              <a:rPr lang="en-US" sz="2600" dirty="0" smtClean="0"/>
-              <a:t>User-friendly interface (GUI)</a:t>
-            </a:r>
-          </a:p>
-          <a:p>
-            <a:pPr lvl="1"/>
-            <a:r>
-              <a:rPr lang="en-US" sz="2600" dirty="0" smtClean="0"/>
-              <a:t>Fast Test Generation</a:t>
-            </a:r>
-          </a:p>
-          <a:p>
-            <a:pPr lvl="1"/>
-            <a:r>
-              <a:rPr lang="en-US" sz="2600" dirty="0" smtClean="0"/>
-              <a:t>Generation of Report for later review or use</a:t>
-            </a:r>
-            <a:endParaRPr lang="en-US" sz="2600" dirty="0"/>
-          </a:p>
-          <a:p>
-            <a:pPr lvl="1"/>
-            <a:r>
-              <a:rPr lang="en-US" sz="2600" dirty="0" smtClean="0"/>
-              <a:t>Comprehensible and well labeled Tables / Buttons</a:t>
-            </a:r>
-          </a:p>
-          <a:p>
-            <a:pPr lvl="1"/>
-            <a:r>
-              <a:rPr lang="en-US" sz="2600" dirty="0" smtClean="0"/>
-              <a:t>Built in result comparison for hand written results and program results</a:t>
-            </a:r>
-          </a:p>
-          <a:p>
-            <a:pPr lvl="1"/>
-            <a:r>
-              <a:rPr lang="en-US" sz="2600" dirty="0" smtClean="0"/>
-              <a:t>Variety of selections</a:t>
-            </a:r>
-          </a:p>
-          <a:p>
-            <a:pPr lvl="2"/>
-            <a:r>
-              <a:rPr lang="en-US" sz="2400" dirty="0" smtClean="0"/>
-              <a:t> </a:t>
-            </a:r>
-            <a:r>
-              <a:rPr lang="en-US" sz="2400" dirty="0"/>
-              <a:t>T</a:t>
-            </a:r>
-            <a:r>
-              <a:rPr lang="en-US" sz="2400" dirty="0" smtClean="0"/>
-              <a:t>esting options / Levels</a:t>
-            </a:r>
-            <a:endParaRPr lang="en-US" sz="2400" dirty="0"/>
+              <a:rPr lang="en-US" sz="5400" dirty="0" smtClean="0"/>
+              <a:t>Demo</a:t>
+            </a:r>
+            <a:endParaRPr lang="en-US" sz="5400" dirty="0"/>
           </a:p>
         </p:txBody>
       </p:sp>
     </p:spTree>
     <p:extLst>
       <p:ext uri="{BB962C8B-B14F-4D97-AF65-F5344CB8AC3E}">
-        <p14:creationId xmlns:p14="http://schemas.microsoft.com/office/powerpoint/2010/main" val="3304484807"/>
+        <p14:creationId xmlns:p14="http://schemas.microsoft.com/office/powerpoint/2010/main" val="1832954467"/>
       </p:ext>
     </p:extLst>
   </p:cSld>
@@ -6378,7 +6305,7 @@
         </p:nvSpPr>
         <p:spPr>
           <a:xfrm>
-            <a:off x="677334" y="690880"/>
+            <a:off x="677334" y="609600"/>
             <a:ext cx="8596668" cy="894080"/>
           </a:xfrm>
         </p:spPr>
@@ -6409,8 +6336,8 @@
         </p:nvSpPr>
         <p:spPr>
           <a:xfrm>
-            <a:off x="677334" y="1584960"/>
-            <a:ext cx="8596668" cy="5740400"/>
+            <a:off x="677334" y="1524000"/>
+            <a:ext cx="8596668" cy="4693919"/>
           </a:xfrm>
         </p:spPr>
         <p:txBody>
@@ -6421,54 +6348,74 @@
           <a:p>
             <a:r>
               <a:rPr lang="en-US" sz="2800" dirty="0" smtClean="0"/>
-              <a:t>Cons / Known Issues</a:t>
+              <a:t>Pros</a:t>
             </a:r>
           </a:p>
           <a:p>
             <a:pPr lvl="1"/>
             <a:r>
               <a:rPr lang="en-US" sz="2600" dirty="0" smtClean="0"/>
-              <a:t>Tables can be hard to understand at times</a:t>
+              <a:t>User-friendly interface (GUI)</a:t>
             </a:r>
           </a:p>
           <a:p>
             <a:pPr lvl="1"/>
             <a:r>
               <a:rPr lang="en-US" sz="2600" dirty="0" smtClean="0"/>
-              <a:t>Level 2 and 3 Boundary testing does the same thing</a:t>
+              <a:t>Fast Test Generation</a:t>
             </a:r>
           </a:p>
           <a:p>
             <a:pPr lvl="1"/>
             <a:r>
               <a:rPr lang="en-US" sz="2600" dirty="0" smtClean="0"/>
-              <a:t>Issue where if check boxes are switched too quickly the generate button won’t be enabled or disabled correctly</a:t>
-            </a:r>
+              <a:t>Generation of Report for later review or use</a:t>
+            </a:r>
+            <a:endParaRPr lang="en-US" sz="2600" dirty="0"/>
           </a:p>
           <a:p>
             <a:pPr lvl="1"/>
             <a:r>
               <a:rPr lang="en-US" sz="2600" dirty="0" smtClean="0"/>
-              <a:t>Menu items to run tests aren’t disabled along with their corresponding button</a:t>
+              <a:t>Comprehensible and well labeled Tables / Buttons</a:t>
             </a:r>
           </a:p>
           <a:p>
             <a:pPr lvl="1"/>
             <a:r>
               <a:rPr lang="en-US" sz="2600" dirty="0" smtClean="0"/>
-              <a:t>File types are not restricted to their appropriate tests (.h files should only be able to do O-O testing)</a:t>
+              <a:t>Built in result comparison for hand written results and program results</a:t>
             </a:r>
           </a:p>
           <a:p>
             <a:pPr lvl="1"/>
-            <a:endParaRPr lang="en-US" sz="2600" dirty="0" smtClean="0"/>
+            <a:r>
+              <a:rPr lang="en-US" sz="2600" dirty="0" smtClean="0"/>
+              <a:t>Variety of selections</a:t>
+            </a:r>
+          </a:p>
+          <a:p>
+            <a:pPr lvl="2"/>
+            <a:r>
+              <a:rPr lang="en-US" sz="2400" dirty="0" smtClean="0"/>
+              <a:t> </a:t>
+            </a:r>
+            <a:r>
+              <a:rPr lang="en-US" sz="2400" dirty="0"/>
+              <a:t>T</a:t>
+            </a:r>
+            <a:r>
+              <a:rPr lang="en-US" sz="2400" dirty="0" smtClean="0"/>
+              <a:t>esting options / Levels</a:t>
+            </a:r>
+            <a:endParaRPr lang="en-US" sz="2400" dirty="0"/>
           </a:p>
         </p:txBody>
       </p:sp>
     </p:spTree>
     <p:extLst>
       <p:ext uri="{BB962C8B-B14F-4D97-AF65-F5344CB8AC3E}">
-        <p14:creationId xmlns:p14="http://schemas.microsoft.com/office/powerpoint/2010/main" val="3264228075"/>
+        <p14:creationId xmlns:p14="http://schemas.microsoft.com/office/powerpoint/2010/main" val="3304484807"/>
       </p:ext>
     </p:extLst>
   </p:cSld>
@@ -6546,7 +6493,7 @@
         <p:spPr>
           <a:xfrm>
             <a:off x="677334" y="1584960"/>
-            <a:ext cx="8596668" cy="4470400"/>
+            <a:ext cx="8596668" cy="5740400"/>
           </a:xfrm>
         </p:spPr>
         <p:txBody>
@@ -6557,49 +6504,54 @@
           <a:p>
             <a:r>
               <a:rPr lang="en-US" sz="2800" dirty="0" smtClean="0"/>
-              <a:t>Other Issues Observed…</a:t>
-            </a:r>
-            <a:endParaRPr lang="en-US" sz="2800" dirty="0"/>
+              <a:t>Cons / Known Issues</a:t>
+            </a:r>
           </a:p>
           <a:p>
             <a:pPr lvl="1"/>
             <a:r>
-              <a:rPr lang="en-US" sz="2600" dirty="0"/>
-              <a:t>Only supports inputs from getlines and &gt;&gt; as well as inputs that have their declarations on the same line as the type</a:t>
+              <a:rPr lang="en-US" sz="2600" dirty="0" smtClean="0"/>
+              <a:t>Tables can be hard to understand at times</a:t>
             </a:r>
           </a:p>
           <a:p>
             <a:pPr lvl="1"/>
             <a:r>
-              <a:rPr lang="en-US" sz="2600" dirty="0"/>
-              <a:t>If the .h file has any private methods </a:t>
-            </a:r>
-            <a:r>
               <a:rPr lang="en-US" sz="2600" dirty="0" smtClean="0"/>
-              <a:t>or </a:t>
-            </a:r>
-            <a:r>
-              <a:rPr lang="en-US" sz="2600" dirty="0"/>
-              <a:t>functions outside of the class, the driver will not generate </a:t>
-            </a:r>
+              <a:t>Level 2 and 3 Boundary testing does the same thing</a:t>
+            </a:r>
+          </a:p>
+          <a:p>
+            <a:pPr lvl="1"/>
             <a:r>
               <a:rPr lang="en-US" sz="2600" dirty="0" smtClean="0"/>
-              <a:t>correctly</a:t>
+              <a:t>Issue where if check boxes are switched too quickly the generate button won’t be enabled or disabled correctly</a:t>
             </a:r>
           </a:p>
           <a:p>
             <a:pPr lvl="1"/>
             <a:r>
               <a:rPr lang="en-US" sz="2600" dirty="0" smtClean="0"/>
-              <a:t>More than one user manual cannot be opened at a time. Will throw an exception.</a:t>
-            </a:r>
+              <a:t>Menu items to run tests aren’t disabled along with their corresponding button</a:t>
+            </a:r>
+          </a:p>
+          <a:p>
+            <a:pPr lvl="1"/>
+            <a:r>
+              <a:rPr lang="en-US" sz="2600" dirty="0" smtClean="0"/>
+              <a:t>File types are not restricted to their appropriate tests (.h files should only be able to do O-O testing)</a:t>
+            </a:r>
+          </a:p>
+          <a:p>
+            <a:pPr lvl="1"/>
+            <a:endParaRPr lang="en-US" sz="2600" dirty="0" smtClean="0"/>
           </a:p>
         </p:txBody>
       </p:sp>
     </p:spTree>
     <p:extLst>
       <p:ext uri="{BB962C8B-B14F-4D97-AF65-F5344CB8AC3E}">
-        <p14:creationId xmlns:p14="http://schemas.microsoft.com/office/powerpoint/2010/main" val="3644525029"/>
+        <p14:creationId xmlns:p14="http://schemas.microsoft.com/office/powerpoint/2010/main" val="3264228075"/>
       </p:ext>
     </p:extLst>
   </p:cSld>
@@ -6645,7 +6597,7 @@
         </p:nvSpPr>
         <p:spPr>
           <a:xfrm>
-            <a:off x="677334" y="609600"/>
+            <a:off x="677334" y="690880"/>
             <a:ext cx="8596668" cy="894080"/>
           </a:xfrm>
         </p:spPr>
@@ -6658,7 +6610,7 @@
             <a:pPr algn="ctr"/>
             <a:r>
               <a:rPr lang="en-US" sz="4400" dirty="0" smtClean="0"/>
-              <a:t>Deviations from Requirements</a:t>
+              <a:t>Pros and Cons</a:t>
             </a:r>
             <a:endParaRPr lang="en-US" sz="4400" dirty="0"/>
           </a:p>
@@ -6676,8 +6628,8 @@
         </p:nvSpPr>
         <p:spPr>
           <a:xfrm>
-            <a:off x="677334" y="1503680"/>
-            <a:ext cx="8873066" cy="4937760"/>
+            <a:off x="677334" y="1584960"/>
+            <a:ext cx="8596668" cy="4470400"/>
           </a:xfrm>
         </p:spPr>
         <p:txBody>
@@ -6686,52 +6638,43 @@
           </a:bodyPr>
           <a:lstStyle/>
           <a:p>
+            <a:r>
+              <a:rPr lang="en-US" sz="2800" dirty="0" smtClean="0"/>
+              <a:t>Other Issues Observed…</a:t>
+            </a:r>
+            <a:endParaRPr lang="en-US" sz="2800" dirty="0"/>
+          </a:p>
+          <a:p>
             <a:pPr lvl="1"/>
             <a:r>
-              <a:rPr lang="en-US" sz="2800" dirty="0" smtClean="0"/>
-              <a:t>GUI differed from requirements</a:t>
-            </a:r>
-          </a:p>
-          <a:p>
-            <a:pPr lvl="2"/>
+              <a:rPr lang="en-US" sz="2600" dirty="0"/>
+              <a:t>Only supports inputs from getlines and &gt;&gt; as well as inputs that have their declarations on the same line as the type</a:t>
+            </a:r>
+          </a:p>
+          <a:p>
+            <a:pPr lvl="1"/>
+            <a:r>
+              <a:rPr lang="en-US" sz="2600" dirty="0"/>
+              <a:t>If the .h file has any private methods </a:t>
+            </a:r>
             <a:r>
               <a:rPr lang="en-US" sz="2600" dirty="0" smtClean="0"/>
-              <a:t>Includes inputs for boundary testing ( Upper and Lower Limits ), instead of solely analyzing the source file as intended</a:t>
+              <a:t>or </a:t>
+            </a:r>
+            <a:r>
+              <a:rPr lang="en-US" sz="2600" dirty="0"/>
+              <a:t>functions outside of the class, the driver will not generate </a:t>
+            </a:r>
+            <a:r>
+              <a:rPr lang="en-US" sz="2600" dirty="0" smtClean="0"/>
+              <a:t>correctly</a:t>
             </a:r>
           </a:p>
           <a:p>
             <a:pPr lvl="1"/>
             <a:r>
-              <a:rPr lang="en-US" sz="2800" dirty="0" smtClean="0"/>
-              <a:t>Method of handling the parsing of strings</a:t>
-            </a:r>
-          </a:p>
-          <a:p>
-            <a:pPr lvl="2"/>
-            <a:r>
               <a:rPr lang="en-US" sz="2600" dirty="0" smtClean="0"/>
-              <a:t>Python Library / Scripts used rather than implementing in C# as intended</a:t>
-            </a:r>
-          </a:p>
-          <a:p>
-            <a:pPr lvl="2"/>
-            <a:r>
-              <a:rPr lang="en-US" sz="2600" dirty="0" smtClean="0"/>
-              <a:t>Current classes differ from original class diagram</a:t>
-            </a:r>
-          </a:p>
-          <a:p>
-            <a:pPr lvl="1"/>
-            <a:r>
-              <a:rPr lang="en-US" sz="2800" dirty="0" smtClean="0"/>
-              <a:t>Default PDF reader requirement not stated</a:t>
-            </a:r>
-          </a:p>
-          <a:p>
-            <a:pPr lvl="2"/>
-            <a:r>
-              <a:rPr lang="en-US" sz="2600" dirty="0" smtClean="0"/>
-              <a:t>Required when opening user manual from program</a:t>
+              <a:t>More than one user manual cannot be opened at a time. Will throw an exception.</a:t>
             </a:r>
           </a:p>
         </p:txBody>
@@ -6739,7 +6682,7 @@
     </p:spTree>
     <p:extLst>
       <p:ext uri="{BB962C8B-B14F-4D97-AF65-F5344CB8AC3E}">
-        <p14:creationId xmlns:p14="http://schemas.microsoft.com/office/powerpoint/2010/main" val="1545557569"/>
+        <p14:creationId xmlns:p14="http://schemas.microsoft.com/office/powerpoint/2010/main" val="3644525029"/>
       </p:ext>
     </p:extLst>
   </p:cSld>
@@ -6783,96 +6726,116 @@
             <p:ph type="title"/>
           </p:nvPr>
         </p:nvSpPr>
-        <p:spPr/>
-        <p:txBody>
-          <a:bodyPr/>
-          <a:lstStyle/>
-          <a:p>
-            <a:r>
-              <a:rPr lang="en-US" dirty="0" smtClean="0"/>
-              <a:t>Deployment Issues</a:t>
-            </a:r>
-            <a:endParaRPr lang="en-US" dirty="0"/>
-          </a:p>
-        </p:txBody>
-      </p:sp>
-      <p:sp>
-        <p:nvSpPr>
-          <p:cNvPr id="3" name="Content Placeholder 2"/>
-          <p:cNvSpPr>
-            <a:spLocks noGrp="1"/>
-          </p:cNvSpPr>
-          <p:nvPr>
-            <p:ph idx="1"/>
-          </p:nvPr>
-        </p:nvSpPr>
-        <p:spPr/>
+        <p:spPr>
+          <a:xfrm>
+            <a:off x="677334" y="609600"/>
+            <a:ext cx="8596668" cy="894080"/>
+          </a:xfrm>
+        </p:spPr>
         <p:txBody>
           <a:bodyPr>
             <a:normAutofit/>
           </a:bodyPr>
           <a:lstStyle/>
           <a:p>
+            <a:pPr algn="ctr"/>
+            <a:r>
+              <a:rPr lang="en-US" sz="4400" dirty="0" smtClean="0"/>
+              <a:t>Deviations from Requirements</a:t>
+            </a:r>
+            <a:endParaRPr lang="en-US" sz="4400" dirty="0"/>
+          </a:p>
+        </p:txBody>
+      </p:sp>
+      <p:sp>
+        <p:nvSpPr>
+          <p:cNvPr id="3" name="Content Placeholder 2"/>
+          <p:cNvSpPr>
+            <a:spLocks noGrp="1"/>
+          </p:cNvSpPr>
+          <p:nvPr>
+            <p:ph idx="1"/>
+          </p:nvPr>
+        </p:nvSpPr>
+        <p:spPr>
+          <a:xfrm>
+            <a:off x="677334" y="1503680"/>
+            <a:ext cx="8873066" cy="4937760"/>
+          </a:xfrm>
+        </p:spPr>
+        <p:txBody>
+          <a:bodyPr>
+            <a:normAutofit/>
+          </a:bodyPr>
+          <a:lstStyle/>
+          <a:p>
+            <a:pPr lvl="1"/>
             <a:r>
               <a:rPr lang="en-US" sz="2800" dirty="0" smtClean="0"/>
-              <a:t>Product must work on target environment</a:t>
+              <a:t>GUI differed from requirements</a:t>
+            </a:r>
+          </a:p>
+          <a:p>
+            <a:pPr lvl="2"/>
+            <a:r>
+              <a:rPr lang="en-US" sz="2600" dirty="0" smtClean="0"/>
+              <a:t>Includes inputs for boundary testing ( Upper and Lower Limits ), instead of solely analyzing the source file as intended</a:t>
             </a:r>
           </a:p>
           <a:p>
             <a:pPr lvl="1"/>
             <a:r>
+              <a:rPr lang="en-US" sz="2800" dirty="0" smtClean="0"/>
+              <a:t>Method of handling the parsing of strings</a:t>
+            </a:r>
+          </a:p>
+          <a:p>
+            <a:pPr lvl="2"/>
+            <a:r>
               <a:rPr lang="en-US" sz="2600" dirty="0" smtClean="0"/>
-              <a:t>Recent Windows Operating Systems</a:t>
+              <a:t>Python Library / Scripts used rather than implementing in C# as intended</a:t>
+            </a:r>
+          </a:p>
+          <a:p>
+            <a:pPr lvl="2"/>
+            <a:r>
+              <a:rPr lang="en-US" sz="2600" dirty="0" smtClean="0"/>
+              <a:t>Current classes differ from original class diagram</a:t>
             </a:r>
           </a:p>
           <a:p>
             <a:pPr lvl="1"/>
             <a:r>
+              <a:rPr lang="en-US" sz="2800" dirty="0" smtClean="0"/>
+              <a:t>Default PDF reader requirement not stated</a:t>
+            </a:r>
+          </a:p>
+          <a:p>
+            <a:pPr lvl="2"/>
+            <a:r>
               <a:rPr lang="en-US" sz="2600" dirty="0" smtClean="0"/>
-              <a:t>Handling problems with permissions and where files are placed on the user’s system</a:t>
-            </a:r>
-          </a:p>
-          <a:p>
-            <a:r>
-              <a:rPr lang="en-US" sz="2600" dirty="0" smtClean="0"/>
-              <a:t>All dependencies must be packaged with product</a:t>
-            </a:r>
-          </a:p>
-          <a:p>
-            <a:pPr lvl="1"/>
-            <a:r>
-              <a:rPr lang="en-US" sz="2400" dirty="0" smtClean="0"/>
-              <a:t>DLLs, input files, other files, </a:t>
-            </a:r>
-            <a:r>
-              <a:rPr lang="en-US" sz="2400" dirty="0" err="1" smtClean="0"/>
-              <a:t>etc</a:t>
-            </a:r>
-            <a:endParaRPr lang="en-US" sz="2400" dirty="0" smtClean="0"/>
-          </a:p>
-          <a:p>
-            <a:r>
-              <a:rPr lang="en-US" sz="2600" dirty="0" smtClean="0"/>
-              <a:t>Make Installation as easy </a:t>
-            </a:r>
-            <a:r>
-              <a:rPr lang="en-US" sz="2600" smtClean="0"/>
-              <a:t>as possible</a:t>
-            </a:r>
-            <a:endParaRPr lang="en-US" sz="2600" dirty="0" smtClean="0"/>
+              <a:t>Required when opening user manual from program</a:t>
+            </a:r>
           </a:p>
         </p:txBody>
       </p:sp>
     </p:spTree>
     <p:extLst>
       <p:ext uri="{BB962C8B-B14F-4D97-AF65-F5344CB8AC3E}">
-        <p14:creationId xmlns:p14="http://schemas.microsoft.com/office/powerpoint/2010/main" val="2790725912"/>
+        <p14:creationId xmlns:p14="http://schemas.microsoft.com/office/powerpoint/2010/main" val="1545557569"/>
       </p:ext>
     </p:extLst>
   </p:cSld>
   <p:clrMapOvr>
     <a:masterClrMapping/>
   </p:clrMapOvr>
+  <p:timing>
+    <p:tnLst>
+      <p:par>
+        <p:cTn id="1" dur="indefinite" restart="never" nodeType="tmRoot"/>
+      </p:par>
+    </p:tnLst>
+  </p:timing>
 </p:sld>
 </file>
 
@@ -6903,24 +6866,16 @@
             <p:ph type="title"/>
           </p:nvPr>
         </p:nvSpPr>
-        <p:spPr>
-          <a:xfrm>
-            <a:off x="677334" y="609600"/>
-            <a:ext cx="8596668" cy="711200"/>
-          </a:xfrm>
-        </p:spPr>
-        <p:txBody>
-          <a:bodyPr>
-            <a:noAutofit/>
-          </a:bodyPr>
-          <a:lstStyle/>
-          <a:p>
-            <a:pPr algn="ctr"/>
-            <a:r>
-              <a:rPr lang="en-US" sz="4400" dirty="0" smtClean="0"/>
-              <a:t>Team Organization</a:t>
-            </a:r>
-            <a:endParaRPr lang="en-US" sz="4400" dirty="0"/>
+        <p:spPr/>
+        <p:txBody>
+          <a:bodyPr/>
+          <a:lstStyle/>
+          <a:p>
+            <a:r>
+              <a:rPr lang="en-US" dirty="0" smtClean="0"/>
+              <a:t>Deployment Issues</a:t>
+            </a:r>
+            <a:endParaRPr lang="en-US" dirty="0"/>
           </a:p>
         </p:txBody>
       </p:sp>
@@ -6934,12 +6889,7 @@
             <p:ph idx="1"/>
           </p:nvPr>
         </p:nvSpPr>
-        <p:spPr>
-          <a:xfrm>
-            <a:off x="677334" y="1483360"/>
-            <a:ext cx="8596668" cy="5100320"/>
-          </a:xfrm>
-        </p:spPr>
+        <p:spPr/>
         <p:txBody>
           <a:bodyPr>
             <a:normAutofit/>
@@ -6948,82 +6898,64 @@
           <a:p>
             <a:r>
               <a:rPr lang="en-US" sz="2800" dirty="0" smtClean="0"/>
-              <a:t>Principles from Agile Processes</a:t>
-            </a:r>
-          </a:p>
-          <a:p>
-            <a:r>
-              <a:rPr lang="en-US" sz="2800" dirty="0" smtClean="0"/>
-              <a:t>Egoless Team Structure</a:t>
+              <a:t>Product must work on target environment</a:t>
             </a:r>
           </a:p>
           <a:p>
             <a:pPr lvl="1"/>
             <a:r>
               <a:rPr lang="en-US" sz="2600" dirty="0" smtClean="0"/>
-              <a:t>Democratic and decentralized</a:t>
+              <a:t>Recent Windows Operating Systems</a:t>
             </a:r>
           </a:p>
           <a:p>
             <a:pPr lvl="1"/>
             <a:r>
               <a:rPr lang="en-US" sz="2600" dirty="0" smtClean="0"/>
-              <a:t>Tasks needed to be done were taken on and chosen by the team member based on their skills and time availability</a:t>
+              <a:t>Handling problems with permissions and where files are placed on the user’s system</a:t>
+            </a:r>
+          </a:p>
+          <a:p>
+            <a:r>
+              <a:rPr lang="en-US" sz="2600" dirty="0" smtClean="0"/>
+              <a:t>All dependencies must be packaged with product</a:t>
             </a:r>
           </a:p>
           <a:p>
             <a:pPr lvl="1"/>
             <a:r>
+              <a:rPr lang="en-US" sz="2400" dirty="0" smtClean="0"/>
+              <a:t>DLLs, input files, other files, </a:t>
+            </a:r>
+            <a:r>
+              <a:rPr lang="en-US" sz="2400" dirty="0" err="1" smtClean="0"/>
+              <a:t>etc</a:t>
+            </a:r>
+            <a:endParaRPr lang="en-US" sz="2400" dirty="0" smtClean="0"/>
+          </a:p>
+          <a:p>
+            <a:r>
               <a:rPr lang="en-US" sz="2600" dirty="0" smtClean="0"/>
-              <a:t>Kept on track with </a:t>
-            </a:r>
-            <a:r>
-              <a:rPr lang="en-US" sz="2600" dirty="0"/>
-              <a:t>g</a:t>
-            </a:r>
-            <a:r>
-              <a:rPr lang="en-US" sz="2600" dirty="0" smtClean="0"/>
-              <a:t>roup chat over Slack</a:t>
-            </a:r>
-          </a:p>
-          <a:p>
-            <a:pPr lvl="2"/>
-            <a:r>
-              <a:rPr lang="en-US" sz="2400" dirty="0" smtClean="0"/>
-              <a:t>Documents shared over GitHub</a:t>
-            </a:r>
-          </a:p>
-          <a:p>
-            <a:pPr lvl="1"/>
-            <a:r>
-              <a:rPr lang="en-US" sz="2600" dirty="0" smtClean="0"/>
-              <a:t>Frequent Meetings in person / in class (if available) / Over the internet  (Google Hangout)</a:t>
-            </a:r>
-            <a:endParaRPr lang="en-US" sz="2800" dirty="0" smtClean="0"/>
-          </a:p>
-          <a:p>
-            <a:pPr lvl="1"/>
-            <a:endParaRPr lang="en-US" sz="2600" dirty="0"/>
+              <a:t>Make Installation as easy </a:t>
+            </a:r>
+            <a:r>
+              <a:rPr lang="en-US" sz="2600" smtClean="0"/>
+              <a:t>as possible</a:t>
+            </a:r>
+            <a:endParaRPr lang="en-US" sz="2600" dirty="0" smtClean="0"/>
           </a:p>
         </p:txBody>
       </p:sp>
     </p:spTree>
     <p:extLst>
       <p:ext uri="{BB962C8B-B14F-4D97-AF65-F5344CB8AC3E}">
-        <p14:creationId xmlns:p14="http://schemas.microsoft.com/office/powerpoint/2010/main" val="344247390"/>
+        <p14:creationId xmlns:p14="http://schemas.microsoft.com/office/powerpoint/2010/main" val="2790725912"/>
       </p:ext>
     </p:extLst>
   </p:cSld>
   <p:clrMapOvr>
     <a:masterClrMapping/>
   </p:clrMapOvr>
-  <p:timing>
-    <p:tnLst>
-      <p:par>
-        <p:cTn id="1" dur="indefinite" restart="never" nodeType="tmRoot"/>
-      </p:par>
-    </p:tnLst>
-  </p:timing>
 </p:sld>
 </file>
 
@@ -7057,19 +6989,19 @@
         <p:spPr>
           <a:xfrm>
             <a:off x="677334" y="609600"/>
-            <a:ext cx="8596668" cy="731520"/>
+            <a:ext cx="8596668" cy="711200"/>
           </a:xfrm>
         </p:spPr>
         <p:txBody>
           <a:bodyPr>
-            <a:normAutofit fontScale="90000"/>
+            <a:noAutofit/>
           </a:bodyPr>
           <a:lstStyle/>
           <a:p>
             <a:pPr algn="ctr"/>
             <a:r>
               <a:rPr lang="en-US" sz="4400" dirty="0" smtClean="0"/>
-              <a:t>Different Approach</a:t>
+              <a:t>Team Organization</a:t>
             </a:r>
             <a:endParaRPr lang="en-US" sz="4400" dirty="0"/>
           </a:p>
@@ -7087,8 +7019,8 @@
         </p:nvSpPr>
         <p:spPr>
           <a:xfrm>
-            <a:off x="677334" y="1503679"/>
-            <a:ext cx="8596668" cy="4537683"/>
+            <a:off x="677334" y="1483360"/>
+            <a:ext cx="8596668" cy="5100320"/>
           </a:xfrm>
         </p:spPr>
         <p:txBody>
@@ -7099,54 +7031,69 @@
           <a:p>
             <a:r>
               <a:rPr lang="en-US" sz="2800" dirty="0" smtClean="0"/>
-              <a:t>If more time permitted…</a:t>
+              <a:t>Principles from Agile Processes</a:t>
+            </a:r>
+          </a:p>
+          <a:p>
+            <a:r>
+              <a:rPr lang="en-US" sz="2800" dirty="0" smtClean="0"/>
+              <a:t>Egoless Team Structure</a:t>
             </a:r>
           </a:p>
           <a:p>
             <a:pPr lvl="1"/>
             <a:r>
               <a:rPr lang="en-US" sz="2600" dirty="0" smtClean="0"/>
-              <a:t>More testing on certain functions</a:t>
+              <a:t>Democratic and decentralized</a:t>
             </a:r>
           </a:p>
           <a:p>
             <a:pPr lvl="1"/>
             <a:r>
               <a:rPr lang="en-US" sz="2600" dirty="0" smtClean="0"/>
-              <a:t>Make tables more distinguished</a:t>
+              <a:t>Tasks needed to be done were taken on and chosen by the team member based on their skills and time availability</a:t>
             </a:r>
           </a:p>
           <a:p>
             <a:pPr lvl="1"/>
             <a:r>
               <a:rPr lang="en-US" sz="2600" dirty="0" smtClean="0"/>
-              <a:t>More language support and threading</a:t>
+              <a:t>Kept on track with </a:t>
+            </a:r>
+            <a:r>
+              <a:rPr lang="en-US" sz="2600" dirty="0"/>
+              <a:t>g</a:t>
+            </a:r>
+            <a:r>
+              <a:rPr lang="en-US" sz="2600" dirty="0" smtClean="0"/>
+              <a:t>roup chat over Slack</a:t>
+            </a:r>
+          </a:p>
+          <a:p>
+            <a:pPr lvl="2"/>
+            <a:r>
+              <a:rPr lang="en-US" sz="2400" dirty="0" smtClean="0"/>
+              <a:t>Documents shared over GitHub</a:t>
             </a:r>
           </a:p>
           <a:p>
             <a:pPr lvl="1"/>
             <a:r>
               <a:rPr lang="en-US" sz="2600" dirty="0" smtClean="0"/>
-              <a:t>Implemented the other 3 testing methods</a:t>
-            </a:r>
+              <a:t>Frequent Meetings in person / in class (if available) / Over the internet  (Google Hangout)</a:t>
+            </a:r>
+            <a:endParaRPr lang="en-US" sz="2800" dirty="0" smtClean="0"/>
           </a:p>
           <a:p>
             <a:pPr lvl="1"/>
-            <a:r>
-              <a:rPr lang="en-US" sz="2600" dirty="0" smtClean="0"/>
-              <a:t>Better version management / better planning</a:t>
-            </a:r>
-          </a:p>
-          <a:p>
-            <a:pPr lvl="1"/>
-            <a:endParaRPr lang="en-US" sz="2600" dirty="0" smtClean="0"/>
+            <a:endParaRPr lang="en-US" sz="2600" dirty="0"/>
           </a:p>
         </p:txBody>
       </p:sp>
     </p:spTree>
     <p:extLst>
       <p:ext uri="{BB962C8B-B14F-4D97-AF65-F5344CB8AC3E}">
-        <p14:creationId xmlns:p14="http://schemas.microsoft.com/office/powerpoint/2010/main" val="3431267459"/>
+        <p14:creationId xmlns:p14="http://schemas.microsoft.com/office/powerpoint/2010/main" val="344247390"/>
       </p:ext>
     </p:extLst>
   </p:cSld>
@@ -7205,7 +7152,7 @@
             <a:pPr algn="ctr"/>
             <a:r>
               <a:rPr lang="en-US" sz="4400" dirty="0" smtClean="0"/>
-              <a:t>Future Extensions</a:t>
+              <a:t>Different Approach</a:t>
             </a:r>
             <a:endParaRPr lang="en-US" sz="4400" dirty="0"/>
           </a:p>
@@ -7235,47 +7182,54 @@
           <a:p>
             <a:r>
               <a:rPr lang="en-US" sz="2800" dirty="0" smtClean="0"/>
-              <a:t>Extend to reading more languages / Certain language options grayed out for future implementation</a:t>
+              <a:t>If more time permitted…</a:t>
             </a:r>
           </a:p>
           <a:p>
             <a:pPr lvl="1"/>
             <a:r>
               <a:rPr lang="en-US" sz="2600" dirty="0" smtClean="0"/>
-              <a:t>Only C++ source code can be selected currently</a:t>
+              <a:t>More testing on certain functions</a:t>
             </a:r>
           </a:p>
           <a:p>
             <a:pPr lvl="1"/>
             <a:r>
               <a:rPr lang="en-US" sz="2600" dirty="0" smtClean="0"/>
-              <a:t>Future languages to be implemented include </a:t>
-            </a:r>
-            <a:r>
-              <a:rPr lang="en-US" sz="2400" dirty="0" smtClean="0"/>
-              <a:t>Java, C# and Python</a:t>
-            </a:r>
-          </a:p>
-          <a:p>
+              <a:t>Make tables more distinguished</a:t>
+            </a:r>
+          </a:p>
+          <a:p>
+            <a:pPr lvl="1"/>
             <a:r>
               <a:rPr lang="en-US" sz="2600" dirty="0" smtClean="0"/>
-              <a:t>Extended to do Path, Functional and Loop testing</a:t>
+              <a:t>More language support and threading</a:t>
             </a:r>
           </a:p>
           <a:p>
             <a:pPr lvl="1"/>
             <a:r>
-              <a:rPr lang="en-US" sz="2400" dirty="0" smtClean="0"/>
-              <a:t>The three implemented right now are Object-Oriented, Random and Boundary Testing</a:t>
-            </a:r>
-            <a:endParaRPr lang="en-US" sz="2400" dirty="0"/>
+              <a:rPr lang="en-US" sz="2600" dirty="0" smtClean="0"/>
+              <a:t>Implemented the other 3 testing methods</a:t>
+            </a:r>
+          </a:p>
+          <a:p>
+            <a:pPr lvl="1"/>
+            <a:r>
+              <a:rPr lang="en-US" sz="2600" dirty="0" smtClean="0"/>
+              <a:t>Better version management / better planning</a:t>
+            </a:r>
+          </a:p>
+          <a:p>
+            <a:pPr lvl="1"/>
+            <a:endParaRPr lang="en-US" sz="2600" dirty="0" smtClean="0"/>
           </a:p>
         </p:txBody>
       </p:sp>
     </p:spTree>
     <p:extLst>
       <p:ext uri="{BB962C8B-B14F-4D97-AF65-F5344CB8AC3E}">
-        <p14:creationId xmlns:p14="http://schemas.microsoft.com/office/powerpoint/2010/main" val="3142858100"/>
+        <p14:creationId xmlns:p14="http://schemas.microsoft.com/office/powerpoint/2010/main" val="3431267459"/>
       </p:ext>
     </p:extLst>
   </p:cSld>
@@ -7334,7 +7288,7 @@
             <a:pPr algn="ctr"/>
             <a:r>
               <a:rPr lang="en-US" sz="4400" dirty="0" smtClean="0"/>
-              <a:t>Conclusion / What we Learned</a:t>
+              <a:t>Future Extensions</a:t>
             </a:r>
             <a:endParaRPr lang="en-US" sz="4400" dirty="0"/>
           </a:p>
@@ -7353,83 +7307,58 @@
         <p:spPr>
           <a:xfrm>
             <a:off x="677334" y="1503679"/>
-            <a:ext cx="8596668" cy="5140961"/>
+            <a:ext cx="8596668" cy="4537683"/>
           </a:xfrm>
         </p:spPr>
         <p:txBody>
           <a:bodyPr>
-            <a:normAutofit lnSpcReduction="10000"/>
+            <a:normAutofit/>
           </a:bodyPr>
           <a:lstStyle/>
           <a:p>
             <a:r>
               <a:rPr lang="en-US" sz="2800" dirty="0" smtClean="0"/>
-              <a:t>How to effectively work in teams</a:t>
-            </a:r>
-          </a:p>
-          <a:p>
-            <a:r>
-              <a:rPr lang="en-US" sz="2800" dirty="0"/>
-              <a:t>Team management is </a:t>
-            </a:r>
-            <a:r>
-              <a:rPr lang="en-US" sz="2800" dirty="0" smtClean="0"/>
-              <a:t>critical</a:t>
+              <a:t>Extend to reading more languages / Certain language options grayed out for future implementation</a:t>
             </a:r>
           </a:p>
           <a:p>
             <a:pPr lvl="1"/>
             <a:r>
               <a:rPr lang="en-US" sz="2600" dirty="0" smtClean="0"/>
-              <a:t>The need for clear communication and task management</a:t>
-            </a:r>
-            <a:endParaRPr lang="en-US" sz="2600" dirty="0"/>
-          </a:p>
-          <a:p>
-            <a:r>
-              <a:rPr lang="en-US" sz="2800" dirty="0" smtClean="0"/>
-              <a:t>The usefulness and importance of the methodologies learned</a:t>
-            </a:r>
-            <a:endParaRPr lang="en-US" sz="2800" dirty="0"/>
-          </a:p>
-          <a:p>
-            <a:r>
-              <a:rPr lang="en-US" sz="2800" dirty="0" smtClean="0"/>
-              <a:t>Importance of testing / Testing is never done</a:t>
-            </a:r>
-          </a:p>
-          <a:p>
-            <a:r>
-              <a:rPr lang="en-US" sz="2800" dirty="0" smtClean="0"/>
-              <a:t>Expect the unexpected</a:t>
+              <a:t>Only C++ source code can be selected currently</a:t>
             </a:r>
           </a:p>
           <a:p>
             <a:pPr lvl="1"/>
             <a:r>
               <a:rPr lang="en-US" sz="2600" dirty="0" smtClean="0"/>
-              <a:t>“Plans never go as devised </a:t>
-            </a:r>
-            <a:r>
-              <a:rPr lang="en-US" sz="2600" smtClean="0"/>
-              <a:t>so </a:t>
-            </a:r>
-            <a:r>
-              <a:rPr lang="en-US" sz="2600" smtClean="0"/>
-              <a:t>it’s </a:t>
-            </a:r>
+              <a:t>Future languages to be implemented include </a:t>
+            </a:r>
+            <a:r>
+              <a:rPr lang="en-US" sz="2400" dirty="0" smtClean="0"/>
+              <a:t>Java, C# and Python</a:t>
+            </a:r>
+          </a:p>
+          <a:p>
             <a:r>
               <a:rPr lang="en-US" sz="2600" dirty="0" smtClean="0"/>
-              <a:t>important to have a fallback to account for the unexpected hiccups”</a:t>
-            </a:r>
-            <a:endParaRPr lang="en-US" sz="2600" dirty="0"/>
+              <a:t>Extended to do Path, Functional and Loop testing</a:t>
+            </a:r>
+          </a:p>
+          <a:p>
+            <a:pPr lvl="1"/>
+            <a:r>
+              <a:rPr lang="en-US" sz="2400" dirty="0" smtClean="0"/>
+              <a:t>The three implemented right now are Object-Oriented, Random and Boundary Testing</a:t>
+            </a:r>
+            <a:endParaRPr lang="en-US" sz="2400" dirty="0"/>
           </a:p>
         </p:txBody>
       </p:sp>
     </p:spTree>
     <p:extLst>
       <p:ext uri="{BB962C8B-B14F-4D97-AF65-F5344CB8AC3E}">
-        <p14:creationId xmlns:p14="http://schemas.microsoft.com/office/powerpoint/2010/main" val="2506438688"/>
+        <p14:creationId xmlns:p14="http://schemas.microsoft.com/office/powerpoint/2010/main" val="3142858100"/>
       </p:ext>
     </p:extLst>
   </p:cSld>
@@ -7602,6 +7531,156 @@
 </file>
 
 <file path=ppt/slides/slide20.xml><?xml version="1.0" encoding="utf-8"?>
+<p:sld xmlns:a="http://schemas.openxmlformats.org/drawingml/2006/main" xmlns:r="http://schemas.openxmlformats.org/officeDocument/2006/relationships" xmlns:p="http://schemas.openxmlformats.org/presentationml/2006/main">
+  <p:cSld>
+    <p:spTree>
+      <p:nvGrpSpPr>
+        <p:cNvPr id="1" name=""/>
+        <p:cNvGrpSpPr/>
+        <p:nvPr/>
+      </p:nvGrpSpPr>
+      <p:grpSpPr>
+        <a:xfrm>
+          <a:off x="0" y="0"/>
+          <a:ext cx="0" cy="0"/>
+          <a:chOff x="0" y="0"/>
+          <a:chExt cx="0" cy="0"/>
+        </a:xfrm>
+      </p:grpSpPr>
+      <p:sp>
+        <p:nvSpPr>
+          <p:cNvPr id="2" name="Title 1"/>
+          <p:cNvSpPr>
+            <a:spLocks noGrp="1"/>
+          </p:cNvSpPr>
+          <p:nvPr>
+            <p:ph type="title"/>
+          </p:nvPr>
+        </p:nvSpPr>
+        <p:spPr>
+          <a:xfrm>
+            <a:off x="677334" y="609600"/>
+            <a:ext cx="8596668" cy="731520"/>
+          </a:xfrm>
+        </p:spPr>
+        <p:txBody>
+          <a:bodyPr>
+            <a:normAutofit fontScale="90000"/>
+          </a:bodyPr>
+          <a:lstStyle/>
+          <a:p>
+            <a:pPr algn="ctr"/>
+            <a:r>
+              <a:rPr lang="en-US" sz="4400" dirty="0" smtClean="0"/>
+              <a:t>Conclusion / What we Learned</a:t>
+            </a:r>
+            <a:endParaRPr lang="en-US" sz="4400" dirty="0"/>
+          </a:p>
+        </p:txBody>
+      </p:sp>
+      <p:sp>
+        <p:nvSpPr>
+          <p:cNvPr id="3" name="Content Placeholder 2"/>
+          <p:cNvSpPr>
+            <a:spLocks noGrp="1"/>
+          </p:cNvSpPr>
+          <p:nvPr>
+            <p:ph idx="1"/>
+          </p:nvPr>
+        </p:nvSpPr>
+        <p:spPr>
+          <a:xfrm>
+            <a:off x="677334" y="1503679"/>
+            <a:ext cx="8596668" cy="5140961"/>
+          </a:xfrm>
+        </p:spPr>
+        <p:txBody>
+          <a:bodyPr>
+            <a:normAutofit lnSpcReduction="10000"/>
+          </a:bodyPr>
+          <a:lstStyle/>
+          <a:p>
+            <a:r>
+              <a:rPr lang="en-US" sz="2800" dirty="0" smtClean="0"/>
+              <a:t>How to effectively work in teams</a:t>
+            </a:r>
+          </a:p>
+          <a:p>
+            <a:r>
+              <a:rPr lang="en-US" sz="2800" dirty="0"/>
+              <a:t>Team management is </a:t>
+            </a:r>
+            <a:r>
+              <a:rPr lang="en-US" sz="2800" dirty="0" smtClean="0"/>
+              <a:t>critical</a:t>
+            </a:r>
+          </a:p>
+          <a:p>
+            <a:pPr lvl="1"/>
+            <a:r>
+              <a:rPr lang="en-US" sz="2600" dirty="0" smtClean="0"/>
+              <a:t>The need for clear communication and task management</a:t>
+            </a:r>
+            <a:endParaRPr lang="en-US" sz="2600" dirty="0"/>
+          </a:p>
+          <a:p>
+            <a:r>
+              <a:rPr lang="en-US" sz="2800" dirty="0" smtClean="0"/>
+              <a:t>The usefulness and importance of the methodologies learned</a:t>
+            </a:r>
+            <a:endParaRPr lang="en-US" sz="2800" dirty="0"/>
+          </a:p>
+          <a:p>
+            <a:r>
+              <a:rPr lang="en-US" sz="2800" dirty="0" smtClean="0"/>
+              <a:t>Importance of testing / Testing is never done</a:t>
+            </a:r>
+          </a:p>
+          <a:p>
+            <a:r>
+              <a:rPr lang="en-US" sz="2800" dirty="0" smtClean="0"/>
+              <a:t>Expect the unexpected</a:t>
+            </a:r>
+          </a:p>
+          <a:p>
+            <a:pPr lvl="1"/>
+            <a:r>
+              <a:rPr lang="en-US" sz="2600" dirty="0" smtClean="0"/>
+              <a:t>“Plans never go as devised </a:t>
+            </a:r>
+            <a:r>
+              <a:rPr lang="en-US" sz="2600" smtClean="0"/>
+              <a:t>so it’s </a:t>
+            </a:r>
+            <a:r>
+              <a:rPr lang="en-US" sz="2600" dirty="0" smtClean="0"/>
+              <a:t>important to have a fallback to account for the unexpected hiccups”</a:t>
+            </a:r>
+            <a:endParaRPr lang="en-US" sz="2600" dirty="0"/>
+          </a:p>
+        </p:txBody>
+      </p:sp>
+    </p:spTree>
+    <p:extLst>
+      <p:ext uri="{BB962C8B-B14F-4D97-AF65-F5344CB8AC3E}">
+        <p14:creationId xmlns:p14="http://schemas.microsoft.com/office/powerpoint/2010/main" val="2506438688"/>
+      </p:ext>
+    </p:extLst>
+  </p:cSld>
+  <p:clrMapOvr>
+    <a:masterClrMapping/>
+  </p:clrMapOvr>
+  <p:timing>
+    <p:tnLst>
+      <p:par>
+        <p:cTn id="1" dur="indefinite" restart="never" nodeType="tmRoot"/>
+      </p:par>
+    </p:tnLst>
+  </p:timing>
+</p:sld>
+</file>
+
+<file path=ppt/slides/slide21.xml><?xml version="1.0" encoding="utf-8"?>
 <p:sld xmlns:a="http://schemas.openxmlformats.org/drawingml/2006/main" xmlns:r="http://schemas.openxmlformats.org/officeDocument/2006/relationships" xmlns:p="http://schemas.openxmlformats.org/presentationml/2006/main">
   <p:cSld>
     <p:spTree>
@@ -8148,15 +8227,22 @@
         </p:spPr>
         <p:txBody>
           <a:bodyPr>
-            <a:normAutofit/>
+            <a:normAutofit fontScale="90000"/>
           </a:bodyPr>
           <a:lstStyle/>
           <a:p>
             <a:pPr algn="ctr"/>
             <a:r>
               <a:rPr lang="en-US" sz="4400" dirty="0" smtClean="0"/>
-              <a:t>System Design</a:t>
-            </a:r>
+              <a:t>System </a:t>
+            </a:r>
+            <a:r>
+              <a:rPr lang="en-US" sz="4400" dirty="0" smtClean="0"/>
+              <a:t>Design – Use Case Diagram</a:t>
+            </a:r>
+            <a:br>
+              <a:rPr lang="en-US" sz="4400" dirty="0" smtClean="0"/>
+            </a:br>
             <a:endParaRPr lang="en-US" sz="4400" dirty="0"/>
           </a:p>
         </p:txBody>
@@ -8252,7 +8338,11 @@
             <a:pPr algn="ctr"/>
             <a:r>
               <a:rPr lang="en-US" sz="4400" dirty="0" smtClean="0"/>
-              <a:t>System Design</a:t>
+              <a:t>System </a:t>
+            </a:r>
+            <a:r>
+              <a:rPr lang="en-US" sz="4400" dirty="0" smtClean="0"/>
+              <a:t>Design – Class Diagram</a:t>
             </a:r>
             <a:endParaRPr lang="en-US" sz="4400" dirty="0"/>
           </a:p>
@@ -8342,14 +8432,18 @@
         </p:spPr>
         <p:txBody>
           <a:bodyPr>
-            <a:normAutofit/>
+            <a:normAutofit fontScale="90000"/>
           </a:bodyPr>
           <a:lstStyle/>
           <a:p>
             <a:pPr algn="ctr"/>
             <a:r>
               <a:rPr lang="en-US" sz="4400" dirty="0" smtClean="0"/>
-              <a:t>System Design</a:t>
+              <a:t>System </a:t>
+            </a:r>
+            <a:r>
+              <a:rPr lang="en-US" sz="4400" dirty="0" smtClean="0"/>
+              <a:t>Design – Sequence Diagram</a:t>
             </a:r>
             <a:endParaRPr lang="en-US" sz="4400" dirty="0"/>
           </a:p>
@@ -8468,14 +8562,18 @@
         </p:spPr>
         <p:txBody>
           <a:bodyPr>
-            <a:normAutofit/>
+            <a:normAutofit fontScale="90000"/>
           </a:bodyPr>
           <a:lstStyle/>
           <a:p>
             <a:pPr algn="ctr"/>
             <a:r>
               <a:rPr lang="en-US" sz="4400" dirty="0" smtClean="0"/>
-              <a:t>System Design</a:t>
+              <a:t>System </a:t>
+            </a:r>
+            <a:r>
+              <a:rPr lang="en-US" sz="4400" dirty="0" smtClean="0"/>
+              <a:t>Design – Sequence Diagram 2</a:t>
             </a:r>
             <a:endParaRPr lang="en-US" sz="4400" dirty="0"/>
           </a:p>

</xml_diff>